<commit_message>
Revised algorithm flowchart graphics
</commit_message>
<xml_diff>
--- a/documentation/AMCParcelDetectionAlgorithmFlowchart16.pptx
+++ b/documentation/AMCParcelDetectionAlgorithmFlowchart16.pptx
@@ -587,7 +587,7 @@
           <a:p>
             <a:fld id="{7DF0F534-4E4A-4E6E-9226-2852A46F6154}" type="datetimeFigureOut">
               <a:rPr lang="en-US" smtClean="0"/>
-              <a:t>8/26/2020</a:t>
+              <a:t>8/28/2020</a:t>
             </a:fld>
             <a:endParaRPr lang="en-US"/>
           </a:p>
@@ -757,7 +757,7 @@
           <a:p>
             <a:fld id="{7DF0F534-4E4A-4E6E-9226-2852A46F6154}" type="datetimeFigureOut">
               <a:rPr lang="en-US" smtClean="0"/>
-              <a:t>8/26/2020</a:t>
+              <a:t>8/28/2020</a:t>
             </a:fld>
             <a:endParaRPr lang="en-US"/>
           </a:p>
@@ -937,7 +937,7 @@
           <a:p>
             <a:fld id="{7DF0F534-4E4A-4E6E-9226-2852A46F6154}" type="datetimeFigureOut">
               <a:rPr lang="en-US" smtClean="0"/>
-              <a:t>8/26/2020</a:t>
+              <a:t>8/28/2020</a:t>
             </a:fld>
             <a:endParaRPr lang="en-US"/>
           </a:p>
@@ -1107,7 +1107,7 @@
           <a:p>
             <a:fld id="{7DF0F534-4E4A-4E6E-9226-2852A46F6154}" type="datetimeFigureOut">
               <a:rPr lang="en-US" smtClean="0"/>
-              <a:t>8/26/2020</a:t>
+              <a:t>8/28/2020</a:t>
             </a:fld>
             <a:endParaRPr lang="en-US"/>
           </a:p>
@@ -1351,7 +1351,7 @@
           <a:p>
             <a:fld id="{7DF0F534-4E4A-4E6E-9226-2852A46F6154}" type="datetimeFigureOut">
               <a:rPr lang="en-US" smtClean="0"/>
-              <a:t>8/26/2020</a:t>
+              <a:t>8/28/2020</a:t>
             </a:fld>
             <a:endParaRPr lang="en-US"/>
           </a:p>
@@ -1583,7 +1583,7 @@
           <a:p>
             <a:fld id="{7DF0F534-4E4A-4E6E-9226-2852A46F6154}" type="datetimeFigureOut">
               <a:rPr lang="en-US" smtClean="0"/>
-              <a:t>8/26/2020</a:t>
+              <a:t>8/28/2020</a:t>
             </a:fld>
             <a:endParaRPr lang="en-US"/>
           </a:p>
@@ -1950,7 +1950,7 @@
           <a:p>
             <a:fld id="{7DF0F534-4E4A-4E6E-9226-2852A46F6154}" type="datetimeFigureOut">
               <a:rPr lang="en-US" smtClean="0"/>
-              <a:t>8/26/2020</a:t>
+              <a:t>8/28/2020</a:t>
             </a:fld>
             <a:endParaRPr lang="en-US"/>
           </a:p>
@@ -2068,7 +2068,7 @@
           <a:p>
             <a:fld id="{7DF0F534-4E4A-4E6E-9226-2852A46F6154}" type="datetimeFigureOut">
               <a:rPr lang="en-US" smtClean="0"/>
-              <a:t>8/26/2020</a:t>
+              <a:t>8/28/2020</a:t>
             </a:fld>
             <a:endParaRPr lang="en-US"/>
           </a:p>
@@ -2163,7 +2163,7 @@
           <a:p>
             <a:fld id="{7DF0F534-4E4A-4E6E-9226-2852A46F6154}" type="datetimeFigureOut">
               <a:rPr lang="en-US" smtClean="0"/>
-              <a:t>8/26/2020</a:t>
+              <a:t>8/28/2020</a:t>
             </a:fld>
             <a:endParaRPr lang="en-US"/>
           </a:p>
@@ -2440,7 +2440,7 @@
           <a:p>
             <a:fld id="{7DF0F534-4E4A-4E6E-9226-2852A46F6154}" type="datetimeFigureOut">
               <a:rPr lang="en-US" smtClean="0"/>
-              <a:t>8/26/2020</a:t>
+              <a:t>8/28/2020</a:t>
             </a:fld>
             <a:endParaRPr lang="en-US"/>
           </a:p>
@@ -2697,7 +2697,7 @@
           <a:p>
             <a:fld id="{7DF0F534-4E4A-4E6E-9226-2852A46F6154}" type="datetimeFigureOut">
               <a:rPr lang="en-US" smtClean="0"/>
-              <a:t>8/26/2020</a:t>
+              <a:t>8/28/2020</a:t>
             </a:fld>
             <a:endParaRPr lang="en-US"/>
           </a:p>
@@ -2910,7 +2910,7 @@
           <a:p>
             <a:fld id="{7DF0F534-4E4A-4E6E-9226-2852A46F6154}" type="datetimeFigureOut">
               <a:rPr lang="en-US" smtClean="0"/>
-              <a:t>8/26/2020</a:t>
+              <a:t>8/28/2020</a:t>
             </a:fld>
             <a:endParaRPr lang="en-US"/>
           </a:p>
@@ -3897,7 +3897,7 @@
         </p:nvSpPr>
         <p:spPr>
           <a:xfrm>
-            <a:off x="577640" y="1968545"/>
+            <a:off x="533400" y="1995104"/>
             <a:ext cx="834807" cy="328996"/>
           </a:xfrm>
           <a:prstGeom prst="flowChartPredefinedProcess">
@@ -3961,8 +3961,8 @@
         </p:nvCxnSpPr>
         <p:spPr>
           <a:xfrm rot="10800000">
-            <a:off x="277258" y="955701"/>
-            <a:ext cx="300383" cy="1177343"/>
+            <a:off x="277258" y="955700"/>
+            <a:ext cx="256143" cy="1203902"/>
           </a:xfrm>
           <a:prstGeom prst="bentConnector2">
             <a:avLst/>
@@ -4289,8 +4289,8 @@
         </p:nvCxnSpPr>
         <p:spPr>
           <a:xfrm rot="10800000" flipV="1">
-            <a:off x="995044" y="1670071"/>
-            <a:ext cx="490856" cy="298474"/>
+            <a:off x="950804" y="1670070"/>
+            <a:ext cx="535096" cy="325033"/>
           </a:xfrm>
           <a:prstGeom prst="bentConnector2">
             <a:avLst/>
@@ -4566,8 +4566,8 @@
         </p:nvCxnSpPr>
         <p:spPr>
           <a:xfrm rot="16200000" flipH="1">
-            <a:off x="1075563" y="2217022"/>
-            <a:ext cx="329818" cy="490856"/>
+            <a:off x="1066722" y="2208182"/>
+            <a:ext cx="303260" cy="535096"/>
           </a:xfrm>
           <a:prstGeom prst="bentConnector2">
             <a:avLst/>
@@ -4892,7 +4892,7 @@
         </p:nvSpPr>
         <p:spPr>
           <a:xfrm>
-            <a:off x="5032680" y="2133043"/>
+            <a:off x="5219700" y="2118256"/>
             <a:ext cx="800100" cy="152400"/>
           </a:xfrm>
           <a:prstGeom prst="flowChartPreparation">
@@ -4942,8 +4942,8 @@
         </p:nvCxnSpPr>
         <p:spPr>
           <a:xfrm rot="5400000" flipH="1" flipV="1">
-            <a:off x="4640908" y="2026036"/>
-            <a:ext cx="208565" cy="574980"/>
+            <a:off x="4727024" y="1925132"/>
+            <a:ext cx="223352" cy="762000"/>
           </a:xfrm>
           <a:prstGeom prst="bentConnector2">
             <a:avLst/>
@@ -5224,7 +5224,7 @@
               <a:r>
                 <a:rPr lang="en-US" sz="700" dirty="0">
                   <a:solidFill>
-                    <a:srgbClr val="FFC000"/>
+                    <a:schemeClr val="accent2"/>
                   </a:solidFill>
                   <a:latin typeface="Consolas" panose="020B0609020204030204" pitchFamily="49" charset="0"/>
                 </a:rPr>
@@ -5289,7 +5289,7 @@
               <a:r>
                 <a:rPr lang="en-US" sz="700" dirty="0">
                   <a:solidFill>
-                    <a:srgbClr val="FFC000"/>
+                    <a:schemeClr val="accent2"/>
                   </a:solidFill>
                   <a:latin typeface="Consolas" panose="020B0609020204030204" pitchFamily="49" charset="0"/>
                 </a:rPr>
@@ -5302,10 +5302,17 @@
                   </a:solidFill>
                   <a:latin typeface="Consolas" panose="020B0609020204030204" pitchFamily="49" charset="0"/>
                 </a:rPr>
-                <a:t>[0] (…)</a:t>
-              </a:r>
-            </a:p>
-            <a:p>
+                <a:t>[</a:t>
+              </a:r>
+              <a:r>
+                <a:rPr lang="en-US" sz="700" dirty="0">
+                  <a:solidFill>
+                    <a:schemeClr val="accent6"/>
+                  </a:solidFill>
+                  <a:latin typeface="Consolas" panose="020B0609020204030204" pitchFamily="49" charset="0"/>
+                </a:rPr>
+                <a:t>0</a:t>
+              </a:r>
               <a:r>
                 <a:rPr lang="en-US" sz="700" dirty="0">
                   <a:solidFill>
@@ -5313,6 +5320,17 @@
                   </a:solidFill>
                   <a:latin typeface="Consolas" panose="020B0609020204030204" pitchFamily="49" charset="0"/>
                 </a:rPr>
+                <a:t>] (…)</a:t>
+              </a:r>
+            </a:p>
+            <a:p>
+              <a:r>
+                <a:rPr lang="en-US" sz="700" dirty="0">
+                  <a:solidFill>
+                    <a:schemeClr val="tx1"/>
+                  </a:solidFill>
+                  <a:latin typeface="Consolas" panose="020B0609020204030204" pitchFamily="49" charset="0"/>
+                </a:rPr>
                 <a:t>        </a:t>
               </a:r>
               <a:r>
@@ -5419,7 +5437,7 @@
               <a:r>
                 <a:rPr lang="en-US" sz="700" dirty="0">
                   <a:solidFill>
-                    <a:srgbClr val="FFC000"/>
+                    <a:schemeClr val="accent2"/>
                   </a:solidFill>
                   <a:latin typeface="Consolas" panose="020B0609020204030204" pitchFamily="49" charset="0"/>
                 </a:rPr>
@@ -5502,7 +5520,7 @@
               <a:r>
                 <a:rPr lang="en-US" sz="700" dirty="0">
                   <a:solidFill>
-                    <a:srgbClr val="FFC000"/>
+                    <a:schemeClr val="accent2"/>
                   </a:solidFill>
                   <a:latin typeface="Consolas" panose="020B0609020204030204" pitchFamily="49" charset="0"/>
                 </a:rPr>
@@ -5580,7 +5598,7 @@
         </p:nvSpPr>
         <p:spPr>
           <a:xfrm>
-            <a:off x="4705000" y="2495996"/>
+            <a:off x="4736751" y="2521235"/>
             <a:ext cx="351058" cy="107722"/>
           </a:xfrm>
           <a:prstGeom prst="rect">
@@ -5826,8 +5844,8 @@
         </p:nvCxnSpPr>
         <p:spPr>
           <a:xfrm rot="16200000" flipH="1">
-            <a:off x="836251" y="2456334"/>
-            <a:ext cx="784074" cy="466488"/>
+            <a:off x="827411" y="2447493"/>
+            <a:ext cx="757514" cy="510728"/>
           </a:xfrm>
           <a:prstGeom prst="bentConnector2">
             <a:avLst/>
@@ -6013,8 +6031,8 @@
         </p:nvCxnSpPr>
         <p:spPr>
           <a:xfrm>
-            <a:off x="5832780" y="2209243"/>
-            <a:ext cx="739470" cy="5525439"/>
+            <a:off x="6019800" y="2194456"/>
+            <a:ext cx="552450" cy="5540226"/>
           </a:xfrm>
           <a:prstGeom prst="bentConnector2">
             <a:avLst/>
@@ -6313,7 +6331,8 @@
           </a:prstGeom>
           <a:ln>
             <a:prstDash val="dash"/>
-            <a:tailEnd type="triangle"/>
+            <a:headEnd type="triangle" w="med" len="med"/>
+            <a:tailEnd type="triangle" w="med" len="med"/>
           </a:ln>
         </p:spPr>
         <p:style>
@@ -6348,18 +6367,19 @@
         </p:nvCxnSpPr>
         <p:spPr>
           <a:xfrm rot="5400000">
-            <a:off x="-837050" y="3528187"/>
-            <a:ext cx="2839782" cy="486047"/>
+            <a:off x="-887991" y="3571177"/>
+            <a:ext cx="2847732" cy="392116"/>
           </a:xfrm>
           <a:prstGeom prst="bentConnector4">
             <a:avLst>
-              <a:gd name="adj1" fmla="val 17571"/>
-              <a:gd name="adj2" fmla="val 147032"/>
+              <a:gd name="adj1" fmla="val 18776"/>
+              <a:gd name="adj2" fmla="val 158299"/>
             </a:avLst>
           </a:prstGeom>
           <a:ln>
             <a:prstDash val="dash"/>
-            <a:tailEnd type="triangle"/>
+            <a:headEnd type="triangle" w="med" len="med"/>
+            <a:tailEnd type="triangle" w="med" len="med"/>
           </a:ln>
         </p:spPr>
         <p:style>
@@ -6406,7 +6426,8 @@
           </a:prstGeom>
           <a:ln>
             <a:prstDash val="dash"/>
-            <a:tailEnd type="triangle"/>
+            <a:headEnd type="triangle" w="med" len="med"/>
+            <a:tailEnd type="triangle" w="med" len="med"/>
           </a:ln>
         </p:spPr>
         <p:style>
@@ -6579,8 +6600,8 @@
         </p:nvCxnSpPr>
         <p:spPr>
           <a:xfrm flipV="1">
-            <a:off x="2994093" y="2285443"/>
-            <a:ext cx="2438637" cy="2797465"/>
+            <a:off x="2994093" y="2270656"/>
+            <a:ext cx="2625657" cy="2812252"/>
           </a:xfrm>
           <a:prstGeom prst="bentConnector2">
             <a:avLst/>
@@ -7252,7 +7273,7 @@
         </p:nvSpPr>
         <p:spPr>
           <a:xfrm>
-            <a:off x="4514446" y="6037258"/>
+            <a:off x="4514870" y="6043240"/>
             <a:ext cx="307777" cy="107722"/>
           </a:xfrm>
           <a:prstGeom prst="rect">
@@ -7287,7 +7308,7 @@
         </p:nvSpPr>
         <p:spPr>
           <a:xfrm>
-            <a:off x="4526400" y="6881465"/>
+            <a:off x="4519507" y="6874035"/>
             <a:ext cx="307777" cy="107722"/>
           </a:xfrm>
           <a:prstGeom prst="rect">

</xml_diff>